<commit_message>
Update TODO to mark Parts and Shape Implementation as complete, add shape embedding to slides, and expand shape types to 40+ variants
- Mark Parts Implementation as complete in TODO (Part trait, PresentationPart, SlidePart, ImagePart, ChartPart, CorePropertiesPart, Relationships)
- Mark Shape Implementation as complete in TODO documenting 40+ shape types, fills, lines, connectors, and shapes_demo.rs
- Expand ShapeType enum from 7 to 40+ types: basic shapes, arrows (8 directions), stars, banners, call
</commit_message>
<xml_diff>
--- a/comprehensive_demo.pptx
+++ b/comprehensive_demo.pptx
@@ -562,14 +562,7 @@
             <a:pPr lvl="0"/>
             <a:r>
               <a:rPr lang="en-US" sz="2800" b="0" i="0"/>
-              <a:t>Rectangle, Circle, Triangle</a:t>
-            </a:r>
-          </a:p>
-          <a:p>
-            <a:pPr lvl="0"/>
-            <a:r>
-              <a:rPr lang="en-US" sz="2800" b="0" i="0"/>
-              <a:t>Diamond, Arrow, Star, Hexagon</a:t>
+              <a:t>Rectangle, Circle, Triangle, and more</a:t>
             </a:r>
           </a:p>
           <a:p>
@@ -586,13 +579,60 @@
               <a:t>Border/line styling</a:t>
             </a:r>
           </a:p>
-          <a:p>
-            <a:pPr lvl="0"/>
-            <a:r>
-              <a:rPr lang="en-US" sz="2800" b="0" i="0"/>
-              <a:t>Text inside shapes</a:t>
-            </a:r>
-          </a:p>
+        </p:txBody>
+      </p:sp>
+      <p:sp>
+        <p:nvSpPr>
+          <p:cNvPr id="10" name="Shape 10"/>
+          <p:cNvSpPr/>
+          <p:nvPr/>
+        </p:nvSpPr>
+        <p:spPr>
+          <a:xfrm>
+            <a:off x="100000" y="100000"/>
+            <a:ext cx="2000000" cy="1000000"/>
+          </a:xfrm>
+          <a:prstGeom prst="rect">
+            <a:avLst/>
+          </a:prstGeom>
+          <a:solidFill>
+            <a:srgbClr val="4F81BD"/>
+          </a:solidFill>
+        </p:spPr>
+        <p:txBody>
+          <a:bodyPr wrap="square" rtlCol="0" anchor="ctr"/>
+          <a:lstStyle/>
+          <a:p>
+            <a:pPr algn="ctr"/>
+            <a:r>
+              <a:rPr lang="en-US" sz="1800" dirty="0"/>
+              <a:t>Rectangle</a:t>
+            </a:r>
+          </a:p>
+        </p:txBody>
+      </p:sp>
+      <p:sp>
+        <p:nvSpPr>
+          <p:cNvPr id="11" name="Shape 11"/>
+          <p:cNvSpPr/>
+          <p:nvPr/>
+        </p:nvSpPr>
+        <p:spPr>
+          <a:xfrm>
+            <a:off x="3500000" y="100000"/>
+            <a:ext cx="1500000" cy="1500000"/>
+          </a:xfrm>
+          <a:prstGeom prst="ellipse">
+            <a:avLst/>
+          </a:prstGeom>
+          <a:solidFill>
+            <a:srgbClr val="C0504D"/>
+          </a:solidFill>
+        </p:spPr>
+        <p:txBody>
+          <a:bodyPr/>
+          <a:lstStyle/>
+          <a:p/>
         </p:txBody>
       </p:sp>
     </p:spTree>

</xml_diff>

<commit_message>
Mark OXML Element Implementations as complete in TODO with comprehensive chart, text, table, shape, and editor modules
- Update TODO to mark OXML Element Implementations section as complete with line counts
- Document 8 implemented modules: presentation (247), slide (447), shapes (306), text (381), table (304), editor (400), xmlchemy (285), dml (352), chart (386)
- Implement comprehensive chart module with ChartKind enum, DataPoint, CategoryPoint, NumericData, StringData, ChartSeries, ChartAxis,
</commit_message>
<xml_diff>
--- a/comprehensive_demo.pptx
+++ b/comprehensive_demo.pptx
@@ -106,12 +106,8 @@
       <p:sp>
         <p:nvSpPr>
           <p:cNvPr id="2" name="Title"/>
-          <p:cNvSpPr>
-            <a:spLocks noGrp="1"/>
-          </p:cNvSpPr>
-          <p:nvPr>
-            <p:ph type="ctrTitle"/>
-          </p:nvPr>
+          <p:cNvSpPr txBox="1"/>
+          <p:nvPr/>
         </p:nvSpPr>
         <p:spPr>
           <a:xfrm>
@@ -124,7 +120,7 @@
           <a:noFill/>
         </p:spPr>
         <p:txBody>
-          <a:bodyPr/>
+          <a:bodyPr wrap="square" rtlCol="0" anchor="ctr"/>
           <a:lstStyle/>
           <a:p>
             <a:pPr algn="ctr"/>
@@ -172,12 +168,8 @@
       <p:sp>
         <p:nvSpPr>
           <p:cNvPr id="2" name="Title"/>
-          <p:cNvSpPr>
-            <a:spLocks noGrp="1"/>
-          </p:cNvSpPr>
-          <p:nvPr>
-            <p:ph type="title"/>
-          </p:nvPr>
+          <p:cNvSpPr txBox="1"/>
+          <p:nvPr/>
         </p:nvSpPr>
         <p:spPr>
           <a:xfrm>
@@ -190,9 +182,10 @@
           <a:noFill/>
         </p:spPr>
         <p:txBody>
-          <a:bodyPr/>
-          <a:lstStyle/>
-          <a:p>
+          <a:bodyPr wrap="square" rtlCol="0" anchor="ctr"/>
+          <a:lstStyle/>
+          <a:p>
+            <a:pPr algn="l"/>
             <a:r>
               <a:rPr lang="en-US" sz="4400" b="1" i="0" dirty="0"/>
               <a:t>Line Chart: Revenue Trend</a:t>
@@ -203,12 +196,8 @@
       <p:sp>
         <p:nvSpPr>
           <p:cNvPr id="3" name="Content"/>
-          <p:cNvSpPr>
-            <a:spLocks noGrp="1"/>
-          </p:cNvSpPr>
-          <p:nvPr>
-            <p:ph type="body" idx="1"/>
-          </p:nvPr>
+          <p:cNvSpPr txBox="1"/>
+          <p:nvPr/>
         </p:nvSpPr>
         <p:spPr>
           <a:xfrm>
@@ -221,7 +210,7 @@
           <a:noFill/>
         </p:spPr>
         <p:txBody>
-          <a:bodyPr/>
+          <a:bodyPr wrap="square" rtlCol="0"/>
           <a:lstStyle/>
           <a:p>
             <a:pPr lvl="0"/>
@@ -279,12 +268,8 @@
       <p:sp>
         <p:nvSpPr>
           <p:cNvPr id="2" name="Title"/>
-          <p:cNvSpPr>
-            <a:spLocks noGrp="1"/>
-          </p:cNvSpPr>
-          <p:nvPr>
-            <p:ph type="title"/>
-          </p:nvPr>
+          <p:cNvSpPr txBox="1"/>
+          <p:nvPr/>
         </p:nvSpPr>
         <p:spPr>
           <a:xfrm>
@@ -297,9 +282,10 @@
           <a:noFill/>
         </p:spPr>
         <p:txBody>
-          <a:bodyPr/>
-          <a:lstStyle/>
-          <a:p>
+          <a:bodyPr wrap="square" rtlCol="0" anchor="ctr"/>
+          <a:lstStyle/>
+          <a:p>
+            <a:pPr algn="l"/>
             <a:r>
               <a:rPr lang="en-US" sz="4400" b="1" i="0" dirty="0"/>
               <a:t>Pie Chart: Market Share</a:t>
@@ -310,12 +296,8 @@
       <p:sp>
         <p:nvSpPr>
           <p:cNvPr id="3" name="Content"/>
-          <p:cNvSpPr>
-            <a:spLocks noGrp="1"/>
-          </p:cNvSpPr>
-          <p:nvPr>
-            <p:ph type="body" idx="1"/>
-          </p:nvPr>
+          <p:cNvSpPr txBox="1"/>
+          <p:nvPr/>
         </p:nvSpPr>
         <p:spPr>
           <a:xfrm>
@@ -328,7 +310,7 @@
           <a:noFill/>
         </p:spPr>
         <p:txBody>
-          <a:bodyPr/>
+          <a:bodyPr wrap="square" rtlCol="0"/>
           <a:lstStyle/>
           <a:p>
             <a:pPr lvl="0"/>
@@ -386,12 +368,8 @@
       <p:sp>
         <p:nvSpPr>
           <p:cNvPr id="2" name="Title"/>
-          <p:cNvSpPr>
-            <a:spLocks noGrp="1"/>
-          </p:cNvSpPr>
-          <p:nvPr>
-            <p:ph type="title"/>
-          </p:nvPr>
+          <p:cNvSpPr txBox="1"/>
+          <p:nvPr/>
         </p:nvSpPr>
         <p:spPr>
           <a:xfrm>
@@ -404,9 +382,10 @@
           <a:noFill/>
         </p:spPr>
         <p:txBody>
-          <a:bodyPr/>
-          <a:lstStyle/>
-          <a:p>
+          <a:bodyPr wrap="square" rtlCol="0" anchor="ctr"/>
+          <a:lstStyle/>
+          <a:p>
+            <a:pPr algn="l"/>
             <a:r>
               <a:rPr lang="en-US" sz="4400" b="1" i="0" dirty="0"/>
               <a:t>Image Support</a:t>
@@ -417,12 +396,8 @@
       <p:sp>
         <p:nvSpPr>
           <p:cNvPr id="3" name="Content"/>
-          <p:cNvSpPr>
-            <a:spLocks noGrp="1"/>
-          </p:cNvSpPr>
-          <p:nvPr>
-            <p:ph type="body" idx="1"/>
-          </p:nvPr>
+          <p:cNvSpPr txBox="1"/>
+          <p:nvPr/>
         </p:nvSpPr>
         <p:spPr>
           <a:xfrm>
@@ -435,7 +410,7 @@
           <a:noFill/>
         </p:spPr>
         <p:txBody>
-          <a:bodyPr/>
+          <a:bodyPr wrap="square" rtlCol="0"/>
           <a:lstStyle/>
           <a:p>
             <a:pPr lvl="0"/>
@@ -563,12 +538,8 @@
       <p:sp>
         <p:nvSpPr>
           <p:cNvPr id="2" name="Title"/>
-          <p:cNvSpPr>
-            <a:spLocks noGrp="1"/>
-          </p:cNvSpPr>
-          <p:nvPr>
-            <p:ph type="title"/>
-          </p:nvPr>
+          <p:cNvSpPr txBox="1"/>
+          <p:nvPr/>
         </p:nvSpPr>
         <p:spPr>
           <a:xfrm>
@@ -581,9 +552,10 @@
           <a:noFill/>
         </p:spPr>
         <p:txBody>
-          <a:bodyPr/>
-          <a:lstStyle/>
-          <a:p>
+          <a:bodyPr wrap="square" rtlCol="0" anchor="ctr"/>
+          <a:lstStyle/>
+          <a:p>
+            <a:pPr algn="l"/>
             <a:r>
               <a:rPr lang="en-US" sz="4400" b="1" i="0" dirty="0"/>
               <a:t>Shape Support</a:t>
@@ -594,12 +566,8 @@
       <p:sp>
         <p:nvSpPr>
           <p:cNvPr id="3" name="Content"/>
-          <p:cNvSpPr>
-            <a:spLocks noGrp="1"/>
-          </p:cNvSpPr>
-          <p:nvPr>
-            <p:ph type="body" idx="1"/>
-          </p:nvPr>
+          <p:cNvSpPr txBox="1"/>
+          <p:nvPr/>
         </p:nvSpPr>
         <p:spPr>
           <a:xfrm>
@@ -612,7 +580,7 @@
           <a:noFill/>
         </p:spPr>
         <p:txBody>
-          <a:bodyPr/>
+          <a:bodyPr wrap="square" rtlCol="0"/>
           <a:lstStyle/>
           <a:p>
             <a:pPr lvl="0"/>
@@ -724,12 +692,8 @@
       <p:sp>
         <p:nvSpPr>
           <p:cNvPr id="2" name="Title"/>
-          <p:cNvSpPr>
-            <a:spLocks noGrp="1"/>
-          </p:cNvSpPr>
-          <p:nvPr>
-            <p:ph type="title"/>
-          </p:nvPr>
+          <p:cNvSpPr txBox="1"/>
+          <p:nvPr/>
         </p:nvSpPr>
         <p:spPr>
           <a:xfrm>
@@ -742,9 +706,10 @@
           <a:noFill/>
         </p:spPr>
         <p:txBody>
-          <a:bodyPr/>
-          <a:lstStyle/>
-          <a:p>
+          <a:bodyPr wrap="square" rtlCol="0" anchor="ctr"/>
+          <a:lstStyle/>
+          <a:p>
+            <a:pPr algn="l"/>
             <a:r>
               <a:rPr lang="en-US" sz="4400" b="1" i="0" dirty="0">
                 <a:solidFill>
@@ -759,12 +724,8 @@
       <p:sp>
         <p:nvSpPr>
           <p:cNvPr id="3" name="Content"/>
-          <p:cNvSpPr>
-            <a:spLocks noGrp="1"/>
-          </p:cNvSpPr>
-          <p:nvPr>
-            <p:ph type="body" idx="1"/>
-          </p:nvPr>
+          <p:cNvSpPr txBox="1"/>
+          <p:nvPr/>
         </p:nvSpPr>
         <p:spPr>
           <a:xfrm>
@@ -777,7 +738,7 @@
           <a:noFill/>
         </p:spPr>
         <p:txBody>
-          <a:bodyPr/>
+          <a:bodyPr wrap="square" rtlCol="0"/>
           <a:lstStyle/>
           <a:p>
             <a:pPr lvl="0"/>
@@ -856,12 +817,8 @@
       <p:sp>
         <p:nvSpPr>
           <p:cNvPr id="2" name="Title"/>
-          <p:cNvSpPr>
-            <a:spLocks noGrp="1"/>
-          </p:cNvSpPr>
-          <p:nvPr>
-            <p:ph type="title"/>
-          </p:nvPr>
+          <p:cNvSpPr txBox="1"/>
+          <p:nvPr/>
         </p:nvSpPr>
         <p:spPr>
           <a:xfrm>
@@ -874,9 +831,10 @@
           <a:noFill/>
         </p:spPr>
         <p:txBody>
-          <a:bodyPr/>
-          <a:lstStyle/>
-          <a:p>
+          <a:bodyPr wrap="square" rtlCol="0" anchor="ctr"/>
+          <a:lstStyle/>
+          <a:p>
+            <a:pPr algn="l"/>
             <a:r>
               <a:rPr lang="en-US" sz="4400" b="1" i="0" dirty="0">
                 <a:solidFill>
@@ -921,12 +879,8 @@
       <p:sp>
         <p:nvSpPr>
           <p:cNvPr id="2" name="Title"/>
-          <p:cNvSpPr>
-            <a:spLocks noGrp="1"/>
-          </p:cNvSpPr>
-          <p:nvPr>
-            <p:ph type="title"/>
-          </p:nvPr>
+          <p:cNvSpPr txBox="1"/>
+          <p:nvPr/>
         </p:nvSpPr>
         <p:spPr>
           <a:xfrm>
@@ -939,9 +893,10 @@
           <a:noFill/>
         </p:spPr>
         <p:txBody>
-          <a:bodyPr/>
-          <a:lstStyle/>
-          <a:p>
+          <a:bodyPr wrap="square" rtlCol="0" anchor="ctr"/>
+          <a:lstStyle/>
+          <a:p>
+            <a:pPr algn="l"/>
             <a:r>
               <a:rPr lang="en-US" sz="4400" b="1" i="0" dirty="0"/>
               <a:t>Available Layouts</a:t>
@@ -952,12 +907,8 @@
       <p:sp>
         <p:nvSpPr>
           <p:cNvPr id="3" name="Content"/>
-          <p:cNvSpPr>
-            <a:spLocks noGrp="1"/>
-          </p:cNvSpPr>
-          <p:nvPr>
-            <p:ph type="body" idx="1"/>
-          </p:nvPr>
+          <p:cNvSpPr txBox="1"/>
+          <p:nvPr/>
         </p:nvSpPr>
         <p:spPr>
           <a:xfrm>
@@ -970,7 +921,7 @@
           <a:noFill/>
         </p:spPr>
         <p:txBody>
-          <a:bodyPr/>
+          <a:bodyPr wrap="square" rtlCol="0"/>
           <a:lstStyle/>
           <a:p>
             <a:pPr lvl="0"/>
@@ -1049,12 +1000,8 @@
       <p:sp>
         <p:nvSpPr>
           <p:cNvPr id="2" name="Title"/>
-          <p:cNvSpPr>
-            <a:spLocks noGrp="1"/>
-          </p:cNvSpPr>
-          <p:nvPr>
-            <p:ph type="title"/>
-          </p:nvPr>
+          <p:cNvSpPr txBox="1"/>
+          <p:nvPr/>
         </p:nvSpPr>
         <p:spPr>
           <a:xfrm>
@@ -1067,9 +1014,10 @@
           <a:noFill/>
         </p:spPr>
         <p:txBody>
-          <a:bodyPr/>
-          <a:lstStyle/>
-          <a:p>
+          <a:bodyPr wrap="square" rtlCol="0" anchor="ctr"/>
+          <a:lstStyle/>
+          <a:p>
+            <a:pPr algn="l"/>
             <a:r>
               <a:rPr lang="en-US" sz="4400" b="1" i="0" dirty="0"/>
               <a:t>Comparison View</a:t>
@@ -1080,12 +1028,8 @@
       <p:sp>
         <p:nvSpPr>
           <p:cNvPr id="3" name="Left Content"/>
-          <p:cNvSpPr>
-            <a:spLocks noGrp="1"/>
-          </p:cNvSpPr>
-          <p:nvPr>
-            <p:ph type="body" idx="1"/>
-          </p:nvPr>
+          <p:cNvSpPr txBox="1"/>
+          <p:nvPr/>
         </p:nvSpPr>
         <p:spPr>
           <a:xfrm>
@@ -1098,7 +1042,7 @@
           <a:noFill/>
         </p:spPr>
         <p:txBody>
-          <a:bodyPr/>
+          <a:bodyPr wrap="square" rtlCol="0"/>
           <a:lstStyle/>
           <a:p>
             <a:pPr lvl="0"/>
@@ -1126,12 +1070,8 @@
       <p:sp>
         <p:nvSpPr>
           <p:cNvPr id="4" name="Right Content"/>
-          <p:cNvSpPr>
-            <a:spLocks noGrp="1"/>
-          </p:cNvSpPr>
-          <p:nvPr>
-            <p:ph type="body" idx="2"/>
-          </p:nvPr>
+          <p:cNvSpPr txBox="1"/>
+          <p:nvPr/>
         </p:nvSpPr>
         <p:spPr>
           <a:xfrm>
@@ -1144,7 +1084,7 @@
           <a:noFill/>
         </p:spPr>
         <p:txBody>
-          <a:bodyPr/>
+          <a:bodyPr wrap="square" rtlCol="0"/>
           <a:lstStyle/>
           <a:p>
             <a:pPr lvl="0"/>
@@ -1202,12 +1142,8 @@
       <p:sp>
         <p:nvSpPr>
           <p:cNvPr id="2" name="Title"/>
-          <p:cNvSpPr>
-            <a:spLocks noGrp="1"/>
-          </p:cNvSpPr>
-          <p:nvPr>
-            <p:ph type="title"/>
-          </p:nvPr>
+          <p:cNvSpPr txBox="1"/>
+          <p:nvPr/>
         </p:nvSpPr>
         <p:spPr>
           <a:xfrm>
@@ -1220,9 +1156,10 @@
           <a:noFill/>
         </p:spPr>
         <p:txBody>
-          <a:bodyPr/>
-          <a:lstStyle/>
-          <a:p>
+          <a:bodyPr wrap="square" rtlCol="0" anchor="ctr"/>
+          <a:lstStyle/>
+          <a:p>
+            <a:pPr algn="l"/>
             <a:r>
               <a:rPr lang="en-US" sz="4400" b="1" i="0" dirty="0">
                 <a:solidFill>
@@ -1237,12 +1174,8 @@
       <p:sp>
         <p:nvSpPr>
           <p:cNvPr id="3" name="Content"/>
-          <p:cNvSpPr>
-            <a:spLocks noGrp="1"/>
-          </p:cNvSpPr>
-          <p:nvPr>
-            <p:ph type="body" idx="1"/>
-          </p:nvPr>
+          <p:cNvSpPr txBox="1"/>
+          <p:nvPr/>
         </p:nvSpPr>
         <p:spPr>
           <a:xfrm>
@@ -1255,7 +1188,7 @@
           <a:noFill/>
         </p:spPr>
         <p:txBody>
-          <a:bodyPr/>
+          <a:bodyPr wrap="square" rtlCol="0"/>
           <a:lstStyle/>
           <a:p>
             <a:pPr lvl="0"/>
@@ -1336,12 +1269,8 @@
       <p:sp>
         <p:nvSpPr>
           <p:cNvPr id="2" name="Title"/>
-          <p:cNvSpPr>
-            <a:spLocks noGrp="1"/>
-          </p:cNvSpPr>
-          <p:nvPr>
-            <p:ph type="title"/>
-          </p:nvPr>
+          <p:cNvSpPr txBox="1"/>
+          <p:nvPr/>
         </p:nvSpPr>
         <p:spPr>
           <a:xfrm>
@@ -1354,9 +1283,10 @@
           <a:noFill/>
         </p:spPr>
         <p:txBody>
-          <a:bodyPr/>
-          <a:lstStyle/>
-          <a:p>
+          <a:bodyPr wrap="square" rtlCol="0" anchor="ctr"/>
+          <a:lstStyle/>
+          <a:p>
+            <a:pPr algn="l"/>
             <a:r>
               <a:rPr lang="en-US" sz="4400" b="1" i="0" dirty="0">
                 <a:solidFill>
@@ -1371,12 +1301,8 @@
       <p:sp>
         <p:nvSpPr>
           <p:cNvPr id="3" name="Content"/>
-          <p:cNvSpPr>
-            <a:spLocks noGrp="1"/>
-          </p:cNvSpPr>
-          <p:nvPr>
-            <p:ph type="body" idx="1"/>
-          </p:nvPr>
+          <p:cNvSpPr txBox="1"/>
+          <p:nvPr/>
         </p:nvSpPr>
         <p:spPr>
           <a:xfrm>
@@ -1389,7 +1315,7 @@
           <a:noFill/>
         </p:spPr>
         <p:txBody>
-          <a:bodyPr/>
+          <a:bodyPr wrap="square" rtlCol="0"/>
           <a:lstStyle/>
           <a:p>
             <a:pPr lvl="0"/>
@@ -1461,12 +1387,8 @@
       <p:sp>
         <p:nvSpPr>
           <p:cNvPr id="2" name="Title"/>
-          <p:cNvSpPr>
-            <a:spLocks noGrp="1"/>
-          </p:cNvSpPr>
-          <p:nvPr>
-            <p:ph type="title"/>
-          </p:nvPr>
+          <p:cNvSpPr txBox="1"/>
+          <p:nvPr/>
         </p:nvSpPr>
         <p:spPr>
           <a:xfrm>
@@ -1479,9 +1401,10 @@
           <a:noFill/>
         </p:spPr>
         <p:txBody>
-          <a:bodyPr/>
-          <a:lstStyle/>
-          <a:p>
+          <a:bodyPr wrap="square" rtlCol="0" anchor="ctr"/>
+          <a:lstStyle/>
+          <a:p>
+            <a:pPr algn="l"/>
             <a:r>
               <a:rPr lang="en-US" sz="4400" b="1" i="0" dirty="0">
                 <a:solidFill>
@@ -1829,12 +1752,8 @@
       <p:sp>
         <p:nvSpPr>
           <p:cNvPr id="2" name="Title"/>
-          <p:cNvSpPr>
-            <a:spLocks noGrp="1"/>
-          </p:cNvSpPr>
-          <p:nvPr>
-            <p:ph type="title"/>
-          </p:nvPr>
+          <p:cNvSpPr txBox="1"/>
+          <p:nvPr/>
         </p:nvSpPr>
         <p:spPr>
           <a:xfrm>
@@ -1847,9 +1766,10 @@
           <a:noFill/>
         </p:spPr>
         <p:txBody>
-          <a:bodyPr/>
-          <a:lstStyle/>
-          <a:p>
+          <a:bodyPr wrap="square" rtlCol="0" anchor="ctr"/>
+          <a:lstStyle/>
+          <a:p>
+            <a:pPr algn="l"/>
             <a:r>
               <a:rPr lang="en-US" sz="4400" b="1" i="0" dirty="0"/>
               <a:t>Product Inventory</a:t>
@@ -1860,12 +1780,8 @@
       <p:sp>
         <p:nvSpPr>
           <p:cNvPr id="3" name="Content"/>
-          <p:cNvSpPr>
-            <a:spLocks noGrp="1"/>
-          </p:cNvSpPr>
-          <p:nvPr>
-            <p:ph type="body" idx="1"/>
-          </p:nvPr>
+          <p:cNvSpPr txBox="1"/>
+          <p:nvPr/>
         </p:nvSpPr>
         <p:spPr>
           <a:xfrm>
@@ -1878,7 +1794,7 @@
           <a:noFill/>
         </p:spPr>
         <p:txBody>
-          <a:bodyPr/>
+          <a:bodyPr wrap="square" rtlCol="0"/>
           <a:lstStyle/>
           <a:p>
             <a:pPr lvl="0"/>
@@ -1936,12 +1852,8 @@
       <p:sp>
         <p:nvSpPr>
           <p:cNvPr id="2" name="Title"/>
-          <p:cNvSpPr>
-            <a:spLocks noGrp="1"/>
-          </p:cNvSpPr>
-          <p:nvPr>
-            <p:ph type="title"/>
-          </p:nvPr>
+          <p:cNvSpPr txBox="1"/>
+          <p:nvPr/>
         </p:nvSpPr>
         <p:spPr>
           <a:xfrm>
@@ -1954,9 +1866,10 @@
           <a:noFill/>
         </p:spPr>
         <p:txBody>
-          <a:bodyPr/>
-          <a:lstStyle/>
-          <a:p>
+          <a:bodyPr wrap="square" rtlCol="0" anchor="ctr"/>
+          <a:lstStyle/>
+          <a:p>
+            <a:pPr algn="l"/>
             <a:r>
               <a:rPr lang="en-US" sz="4400" b="1" i="0" dirty="0"/>
               <a:t>Bar Chart: Regional Sales</a:t>
@@ -1967,12 +1880,8 @@
       <p:sp>
         <p:nvSpPr>
           <p:cNvPr id="3" name="Content"/>
-          <p:cNvSpPr>
-            <a:spLocks noGrp="1"/>
-          </p:cNvSpPr>
-          <p:nvPr>
-            <p:ph type="body" idx="1"/>
-          </p:nvPr>
+          <p:cNvSpPr txBox="1"/>
+          <p:nvPr/>
         </p:nvSpPr>
         <p:spPr>
           <a:xfrm>
@@ -1985,7 +1894,7 @@
           <a:noFill/>
         </p:spPr>
         <p:txBody>
-          <a:bodyPr/>
+          <a:bodyPr wrap="square" rtlCol="0"/>
           <a:lstStyle/>
           <a:p>
             <a:pPr lvl="0"/>

</xml_diff>

<commit_message>
Enhance TableCell struct with additional formatting options
- Introduced italic, underline, text color, font size, and font family properties to the TableCell struct.
- Updated generate_cell_xml function to handle new formatting options for cell text.
- Added comprehensive tests for new features, ensuring proper XML generation for various text styles and attributes.
- Updated existing tests to reflect changes in TableCell initialization and formatting capabilities.
</commit_message>
<xml_diff>
--- a/comprehensive_demo.pptx
+++ b/comprehensive_demo.pptx
@@ -957,7 +957,7 @@
                     <a:p>
                       <a:pPr algn="ctr"/>
                       <a:r>
-                        <a:rPr lang="en-US" sz="2000" b="0"/>
+                        <a:rPr lang="en-US" sz="2000"/>
                         <a:t>Normal Cell</a:t>
                       </a:r>
                     </a:p>
@@ -975,7 +975,7 @@
                     <a:p>
                       <a:pPr algn="ctr"/>
                       <a:r>
-                        <a:rPr lang="en-US" sz="2000" b="0"/>
+                        <a:rPr lang="en-US" sz="2000"/>
                         <a:t>Colored</a:t>
                       </a:r>
                     </a:p>
@@ -995,7 +995,7 @@
                     <a:p>
                       <a:pPr algn="ctr"/>
                       <a:r>
-                        <a:rPr lang="en-US" sz="2000" b="0"/>
+                        <a:rPr lang="en-US" sz="2000"/>
                         <a:t>Red BG</a:t>
                       </a:r>
                     </a:p>
@@ -1013,7 +1013,7 @@
                     <a:p>
                       <a:pPr algn="ctr"/>
                       <a:r>
-                        <a:rPr lang="en-US" sz="2000" b="0"/>
+                        <a:rPr lang="en-US" sz="2000"/>
                         <a:t>Green BG</a:t>
                       </a:r>
                     </a:p>
@@ -1031,7 +1031,7 @@
                     <a:p>
                       <a:pPr algn="ctr"/>
                       <a:r>
-                        <a:rPr lang="en-US" sz="2000" b="0"/>
+                        <a:rPr lang="en-US" sz="2000"/>
                         <a:t>Blue BG</a:t>
                       </a:r>
                     </a:p>
@@ -1051,7 +1051,7 @@
                     <a:p>
                       <a:pPr algn="ctr"/>
                       <a:r>
-                        <a:rPr lang="en-US" sz="2000" b="0"/>
+                        <a:rPr lang="en-US" sz="2000"/>
                         <a:t>Row 3 Col 1</a:t>
                       </a:r>
                     </a:p>
@@ -1069,7 +1069,7 @@
                     <a:p>
                       <a:pPr algn="ctr"/>
                       <a:r>
-                        <a:rPr lang="en-US" sz="2000" b="0"/>
+                        <a:rPr lang="en-US" sz="2000"/>
                         <a:t>Row 3 Col 2</a:t>
                       </a:r>
                     </a:p>

</xml_diff>

<commit_message>
Implement validation command for PPTX files and enhance layout constants usage
- Added a new `ValidateCommand` to the CLI for validating PPTX files against ECMA-376 compliance.
- Implemented file validation logic, including ZIP integrity checks and required file presence.
- Refactored layout generation to utilize shared constants for positioning and sizing, improving maintainability.
- Updated `TODO.md` to reflect completed high-priority tasks related to validation and layout constants extraction.
</commit_message>
<xml_diff>
--- a/comprehensive_demo.pptx
+++ b/comprehensive_demo.pptx
@@ -883,7 +883,7 @@
                     <a:p>
                       <a:pPr algn="ctr"/>
                       <a:r>
-                        <a:rPr lang="en-US" sz="2000" b="1"/>
+                        <a:rPr lang="en-US" sz="2000" b="1" i="0"/>
                         <a:t>Header 1</a:t>
                       </a:r>
                     </a:p>
@@ -901,7 +901,7 @@
                     <a:p>
                       <a:pPr algn="ctr"/>
                       <a:r>
-                        <a:rPr lang="en-US" sz="2000" b="1"/>
+                        <a:rPr lang="en-US" sz="2000" b="1" i="0"/>
                         <a:t>Header 2</a:t>
                       </a:r>
                     </a:p>
@@ -919,7 +919,7 @@
                     <a:p>
                       <a:pPr algn="ctr"/>
                       <a:r>
-                        <a:rPr lang="en-US" sz="2000" b="1"/>
+                        <a:rPr lang="en-US" sz="2000" b="1" i="0"/>
                         <a:t>Header 3</a:t>
                       </a:r>
                     </a:p>
@@ -939,7 +939,7 @@
                     <a:p>
                       <a:pPr algn="ctr"/>
                       <a:r>
-                        <a:rPr lang="en-US" sz="2000" b="1"/>
+                        <a:rPr lang="en-US" sz="2000" b="1" i="0"/>
                         <a:t>Bold Cell</a:t>
                       </a:r>
                     </a:p>
@@ -957,7 +957,7 @@
                     <a:p>
                       <a:pPr algn="ctr"/>
                       <a:r>
-                        <a:rPr lang="en-US" sz="2000"/>
+                        <a:rPr lang="en-US" sz="2000" b="0" i="0"/>
                         <a:t>Normal Cell</a:t>
                       </a:r>
                     </a:p>
@@ -975,7 +975,7 @@
                     <a:p>
                       <a:pPr algn="ctr"/>
                       <a:r>
-                        <a:rPr lang="en-US" sz="2000"/>
+                        <a:rPr lang="en-US" sz="2000" b="0" i="0"/>
                         <a:t>Colored</a:t>
                       </a:r>
                     </a:p>
@@ -995,7 +995,7 @@
                     <a:p>
                       <a:pPr algn="ctr"/>
                       <a:r>
-                        <a:rPr lang="en-US" sz="2000"/>
+                        <a:rPr lang="en-US" sz="2000" b="0" i="0"/>
                         <a:t>Red BG</a:t>
                       </a:r>
                     </a:p>
@@ -1013,7 +1013,7 @@
                     <a:p>
                       <a:pPr algn="ctr"/>
                       <a:r>
-                        <a:rPr lang="en-US" sz="2000"/>
+                        <a:rPr lang="en-US" sz="2000" b="0" i="0"/>
                         <a:t>Green BG</a:t>
                       </a:r>
                     </a:p>
@@ -1031,7 +1031,7 @@
                     <a:p>
                       <a:pPr algn="ctr"/>
                       <a:r>
-                        <a:rPr lang="en-US" sz="2000"/>
+                        <a:rPr lang="en-US" sz="2000" b="0" i="0"/>
                         <a:t>Blue BG</a:t>
                       </a:r>
                     </a:p>
@@ -1051,7 +1051,7 @@
                     <a:p>
                       <a:pPr algn="ctr"/>
                       <a:r>
-                        <a:rPr lang="en-US" sz="2000"/>
+                        <a:rPr lang="en-US" sz="2000" b="0" i="0"/>
                         <a:t>Row 3 Col 1</a:t>
                       </a:r>
                     </a:p>
@@ -1069,7 +1069,7 @@
                     <a:p>
                       <a:pPr algn="ctr"/>
                       <a:r>
-                        <a:rPr lang="en-US" sz="2000"/>
+                        <a:rPr lang="en-US" sz="2000" b="0" i="0"/>
                         <a:t>Row 3 Col 2</a:t>
                       </a:r>
                     </a:p>
@@ -1087,7 +1087,7 @@
                     <a:p>
                       <a:pPr algn="ctr"/>
                       <a:r>
-                        <a:rPr lang="en-US" sz="2000" b="1"/>
+                        <a:rPr lang="en-US" sz="2000" b="1" i="0"/>
                         <a:t>Row 3 Col 3</a:t>
                       </a:r>
                     </a:p>

</xml_diff>

<commit_message>
Modularize table module and fix text rendering with proper font defaults
- Create modular `generator/table/` structure with `cell.rs`, `row.rs`, `builder.rs`, `xml.rs`
- Add `CellAlign` and `CellVAlign` enums for horizontal/vertical alignment
- Fix table cell text rendering: always include font specification (latin, ea, cs), default black text color, dirty="0" attribute
- Change default font size from 20pt to 18pt (1800 hundredths)
- Add text wrapping support to TableCell
- Keep old `tables.rs` an
</commit_message>
<xml_diff>
--- a/comprehensive_demo.pptx
+++ b/comprehensive_demo.pptx
@@ -619,7 +619,7 @@
                     <a:p>
                       <a:pPr algn="ctr"/>
                       <a:r>
-                        <a:rPr lang="en-US" sz="1400" b="1" i="0">
+                        <a:rPr lang="en-US" sz="1400" b="1" i="0" dirty="0">
                           <a:solidFill>
                             <a:srgbClr val="FFFFFF"/>
                           </a:solidFill>
@@ -644,7 +644,7 @@
                     <a:p>
                       <a:pPr algn="ctr"/>
                       <a:r>
-                        <a:rPr lang="en-US" sz="2000" b="0" i="0">
+                        <a:rPr lang="en-US" sz="1800" b="0" i="0" dirty="0">
                           <a:solidFill>
                             <a:srgbClr val="000000"/>
                           </a:solidFill>
@@ -669,7 +669,7 @@
                     <a:p>
                       <a:pPr algn="ctr"/>
                       <a:r>
-                        <a:rPr lang="en-US" sz="2000" b="0" i="0">
+                        <a:rPr lang="en-US" sz="1800" b="0" i="0" dirty="0">
                           <a:solidFill>
                             <a:srgbClr val="000000"/>
                           </a:solidFill>
@@ -694,7 +694,7 @@
                     <a:p>
                       <a:pPr algn="ctr"/>
                       <a:r>
-                        <a:rPr lang="en-US" sz="2000" b="0" i="0">
+                        <a:rPr lang="en-US" sz="1800" b="0" i="0" dirty="0">
                           <a:solidFill>
                             <a:srgbClr val="000000"/>
                           </a:solidFill>
@@ -721,7 +721,7 @@
                     <a:p>
                       <a:pPr algn="ctr"/>
                       <a:r>
-                        <a:rPr lang="en-US" sz="2000" b="1" i="0">
+                        <a:rPr lang="en-US" sz="1800" b="1" i="0" dirty="0">
                           <a:solidFill>
                             <a:srgbClr val="FFFFFF"/>
                           </a:solidFill>
@@ -746,7 +746,7 @@
                     <a:p>
                       <a:pPr algn="ctr"/>
                       <a:r>
-                        <a:rPr lang="en-US" sz="2000" b="1" i="0">
+                        <a:rPr lang="en-US" sz="1800" b="1" i="0" dirty="0">
                           <a:solidFill>
                             <a:srgbClr val="FFFFFF"/>
                           </a:solidFill>
@@ -771,7 +771,7 @@
                     <a:p>
                       <a:pPr algn="ctr"/>
                       <a:r>
-                        <a:rPr lang="en-US" sz="2000" b="1" i="0">
+                        <a:rPr lang="en-US" sz="1800" b="1" i="0" dirty="0">
                           <a:solidFill>
                             <a:srgbClr val="FFFFFF"/>
                           </a:solidFill>
@@ -796,7 +796,7 @@
                     <a:p>
                       <a:pPr algn="ctr"/>
                       <a:r>
-                        <a:rPr lang="en-US" sz="2000" b="1" i="0">
+                        <a:rPr lang="en-US" sz="1800" b="1" i="0" dirty="0">
                           <a:solidFill>
                             <a:srgbClr val="FFFFFF"/>
                           </a:solidFill>
@@ -823,7 +823,7 @@
                     <a:p>
                       <a:pPr algn="l"/>
                       <a:r>
-                        <a:rPr lang="en-US" sz="2000" b="0" i="0">
+                        <a:rPr lang="en-US" sz="1800" b="0" i="0" dirty="0">
                           <a:solidFill>
                             <a:srgbClr val="000000"/>
                           </a:solidFill>
@@ -848,7 +848,7 @@
                     <a:p>
                       <a:pPr algn="r"/>
                       <a:r>
-                        <a:rPr lang="en-US" sz="2000" b="0" i="0">
+                        <a:rPr lang="en-US" sz="1800" b="0" i="0" dirty="0">
                           <a:solidFill>
                             <a:srgbClr val="2E7D32"/>
                           </a:solidFill>
@@ -873,7 +873,7 @@
                     <a:p>
                       <a:pPr algn="r"/>
                       <a:r>
-                        <a:rPr lang="en-US" sz="2000" b="0" i="0">
+                        <a:rPr lang="en-US" sz="1800" b="0" i="0" dirty="0">
                           <a:solidFill>
                             <a:srgbClr val="C62828"/>
                           </a:solidFill>
@@ -898,7 +898,7 @@
                     <a:p>
                       <a:pPr algn="r"/>
                       <a:r>
-                        <a:rPr lang="en-US" sz="2000" b="1" i="0">
+                        <a:rPr lang="en-US" sz="1800" b="1" i="0" dirty="0">
                           <a:solidFill>
                             <a:srgbClr val="2E7D32"/>
                           </a:solidFill>
@@ -925,7 +925,7 @@
                     <a:p>
                       <a:pPr algn="l"/>
                       <a:r>
-                        <a:rPr lang="en-US" sz="2000" b="0" i="0">
+                        <a:rPr lang="en-US" sz="1800" b="0" i="0" dirty="0">
                           <a:solidFill>
                             <a:srgbClr val="000000"/>
                           </a:solidFill>
@@ -950,7 +950,7 @@
                     <a:p>
                       <a:pPr algn="r"/>
                       <a:r>
-                        <a:rPr lang="en-US" sz="2000" b="0" i="0">
+                        <a:rPr lang="en-US" sz="1800" b="0" i="0" dirty="0">
                           <a:solidFill>
                             <a:srgbClr val="2E7D32"/>
                           </a:solidFill>
@@ -975,7 +975,7 @@
                     <a:p>
                       <a:pPr algn="r"/>
                       <a:r>
-                        <a:rPr lang="en-US" sz="2000" b="0" i="0">
+                        <a:rPr lang="en-US" sz="1800" b="0" i="0" dirty="0">
                           <a:solidFill>
                             <a:srgbClr val="C62828"/>
                           </a:solidFill>
@@ -1000,7 +1000,7 @@
                     <a:p>
                       <a:pPr algn="r"/>
                       <a:r>
-                        <a:rPr lang="en-US" sz="2000" b="1" i="0">
+                        <a:rPr lang="en-US" sz="1800" b="1" i="0" dirty="0">
                           <a:solidFill>
                             <a:srgbClr val="2E7D32"/>
                           </a:solidFill>
@@ -1027,7 +1027,7 @@
                     <a:p>
                       <a:pPr algn="l"/>
                       <a:r>
-                        <a:rPr lang="en-US" sz="2000" b="1" i="0">
+                        <a:rPr lang="en-US" sz="1800" b="1" i="0" dirty="0">
                           <a:solidFill>
                             <a:srgbClr val="000000"/>
                           </a:solidFill>
@@ -1052,7 +1052,7 @@
                     <a:p>
                       <a:pPr algn="r"/>
                       <a:r>
-                        <a:rPr lang="en-US" sz="2000" b="1" i="0">
+                        <a:rPr lang="en-US" sz="1800" b="1" i="0" dirty="0">
                           <a:solidFill>
                             <a:srgbClr val="000000"/>
                           </a:solidFill>
@@ -1077,7 +1077,7 @@
                     <a:p>
                       <a:pPr algn="r"/>
                       <a:r>
-                        <a:rPr lang="en-US" sz="2000" b="1" i="0">
+                        <a:rPr lang="en-US" sz="1800" b="1" i="0" dirty="0">
                           <a:solidFill>
                             <a:srgbClr val="000000"/>
                           </a:solidFill>
@@ -1102,7 +1102,7 @@
                     <a:p>
                       <a:pPr algn="r"/>
                       <a:r>
-                        <a:rPr lang="en-US" sz="2000" b="1" i="0">
+                        <a:rPr lang="en-US" sz="1800" b="1" i="0" dirty="0">
                           <a:solidFill>
                             <a:srgbClr val="006100"/>
                           </a:solidFill>
@@ -1215,7 +1215,7 @@
                     <a:p>
                       <a:pPr algn="ctr"/>
                       <a:r>
-                        <a:rPr lang="en-US" sz="2000" b="1" i="0">
+                        <a:rPr lang="en-US" sz="1800" b="1" i="0" dirty="0">
                           <a:solidFill>
                             <a:srgbClr val="FFFFFF"/>
                           </a:solidFill>
@@ -1240,7 +1240,7 @@
                     <a:p>
                       <a:pPr algn="ctr"/>
                       <a:r>
-                        <a:rPr lang="en-US" sz="2000" b="1" i="0">
+                        <a:rPr lang="en-US" sz="1800" b="1" i="0" dirty="0">
                           <a:solidFill>
                             <a:srgbClr val="FFFFFF"/>
                           </a:solidFill>
@@ -1265,7 +1265,7 @@
                     <a:p>
                       <a:pPr algn="ctr"/>
                       <a:r>
-                        <a:rPr lang="en-US" sz="2000" b="1" i="0">
+                        <a:rPr lang="en-US" sz="1800" b="1" i="0" dirty="0">
                           <a:solidFill>
                             <a:srgbClr val="FFFFFF"/>
                           </a:solidFill>
@@ -1290,7 +1290,7 @@
                     <a:p>
                       <a:pPr algn="ctr"/>
                       <a:r>
-                        <a:rPr lang="en-US" sz="2000" b="1" i="0">
+                        <a:rPr lang="en-US" sz="1800" b="1" i="0" dirty="0">
                           <a:solidFill>
                             <a:srgbClr val="FFFFFF"/>
                           </a:solidFill>
@@ -1317,7 +1317,7 @@
                     <a:p>
                       <a:pPr algn="ctr"/>
                       <a:r>
-                        <a:rPr lang="en-US" sz="2000" b="0" i="0">
+                        <a:rPr lang="en-US" sz="1800" b="0" i="0" dirty="0">
                           <a:solidFill>
                             <a:srgbClr val="000000"/>
                           </a:solidFill>
@@ -1342,7 +1342,7 @@
                     <a:p>
                       <a:pPr algn="ctr"/>
                       <a:r>
-                        <a:rPr lang="en-US" sz="2000" b="0" i="0">
+                        <a:rPr lang="en-US" sz="1800" b="0" i="0" dirty="0">
                           <a:solidFill>
                             <a:srgbClr val="000000"/>
                           </a:solidFill>
@@ -1367,7 +1367,7 @@
                     <a:p>
                       <a:pPr algn="ctr"/>
                       <a:r>
-                        <a:rPr lang="en-US" sz="2000" b="0" i="0">
+                        <a:rPr lang="en-US" sz="1800" b="0" i="0" dirty="0">
                           <a:solidFill>
                             <a:srgbClr val="000000"/>
                           </a:solidFill>
@@ -1392,7 +1392,7 @@
                     <a:p>
                       <a:pPr algn="ctr"/>
                       <a:r>
-                        <a:rPr lang="en-US" sz="2000" b="1" i="0">
+                        <a:rPr lang="en-US" sz="1800" b="1" i="0" dirty="0">
                           <a:solidFill>
                             <a:srgbClr val="2E7D32"/>
                           </a:solidFill>
@@ -1419,7 +1419,7 @@
                     <a:p>
                       <a:pPr algn="ctr"/>
                       <a:r>
-                        <a:rPr lang="en-US" sz="2000" b="0" i="0">
+                        <a:rPr lang="en-US" sz="1800" b="0" i="0" dirty="0">
                           <a:solidFill>
                             <a:srgbClr val="000000"/>
                           </a:solidFill>
@@ -1444,7 +1444,7 @@
                     <a:p>
                       <a:pPr algn="ctr"/>
                       <a:r>
-                        <a:rPr lang="en-US" sz="2000" b="0" i="0">
+                        <a:rPr lang="en-US" sz="1800" b="0" i="0" dirty="0">
                           <a:solidFill>
                             <a:srgbClr val="000000"/>
                           </a:solidFill>
@@ -1469,7 +1469,7 @@
                     <a:p>
                       <a:pPr algn="ctr"/>
                       <a:r>
-                        <a:rPr lang="en-US" sz="2000" b="0" i="0">
+                        <a:rPr lang="en-US" sz="1800" b="0" i="0" dirty="0">
                           <a:solidFill>
                             <a:srgbClr val="000000"/>
                           </a:solidFill>
@@ -1494,7 +1494,7 @@
                     <a:p>
                       <a:pPr algn="ctr"/>
                       <a:r>
-                        <a:rPr lang="en-US" sz="2000" b="1" i="0">
+                        <a:rPr lang="en-US" sz="1800" b="1" i="0" dirty="0">
                           <a:solidFill>
                             <a:srgbClr val="2E7D32"/>
                           </a:solidFill>
@@ -1521,7 +1521,7 @@
                     <a:p>
                       <a:pPr algn="ctr"/>
                       <a:r>
-                        <a:rPr lang="en-US" sz="2000" b="0" i="0">
+                        <a:rPr lang="en-US" sz="1800" b="0" i="0" dirty="0">
                           <a:solidFill>
                             <a:srgbClr val="000000"/>
                           </a:solidFill>
@@ -1546,7 +1546,7 @@
                     <a:p>
                       <a:pPr algn="ctr"/>
                       <a:r>
-                        <a:rPr lang="en-US" sz="2000" b="0" i="0">
+                        <a:rPr lang="en-US" sz="1800" b="0" i="0" dirty="0">
                           <a:solidFill>
                             <a:srgbClr val="000000"/>
                           </a:solidFill>
@@ -1571,7 +1571,7 @@
                     <a:p>
                       <a:pPr algn="ctr"/>
                       <a:r>
-                        <a:rPr lang="en-US" sz="2000" b="0" i="0">
+                        <a:rPr lang="en-US" sz="1800" b="0" i="0" dirty="0">
                           <a:solidFill>
                             <a:srgbClr val="000000"/>
                           </a:solidFill>
@@ -1596,7 +1596,7 @@
                     <a:p>
                       <a:pPr algn="ctr"/>
                       <a:r>
-                        <a:rPr lang="en-US" sz="2000" b="1" i="0">
+                        <a:rPr lang="en-US" sz="1800" b="1" i="0" dirty="0">
                           <a:solidFill>
                             <a:srgbClr val="2E7D32"/>
                           </a:solidFill>
@@ -1623,7 +1623,7 @@
                     <a:p>
                       <a:pPr algn="ctr"/>
                       <a:r>
-                        <a:rPr lang="en-US" sz="2000" b="0" i="0">
+                        <a:rPr lang="en-US" sz="1800" b="0" i="0" dirty="0">
                           <a:solidFill>
                             <a:srgbClr val="000000"/>
                           </a:solidFill>
@@ -1648,7 +1648,7 @@
                     <a:p>
                       <a:pPr algn="ctr"/>
                       <a:r>
-                        <a:rPr lang="en-US" sz="2000" b="0" i="0">
+                        <a:rPr lang="en-US" sz="1800" b="0" i="0" dirty="0">
                           <a:solidFill>
                             <a:srgbClr val="C62828"/>
                           </a:solidFill>
@@ -1673,7 +1673,7 @@
                     <a:p>
                       <a:pPr algn="ctr"/>
                       <a:r>
-                        <a:rPr lang="en-US" sz="2000" b="0" i="0">
+                        <a:rPr lang="en-US" sz="1800" b="0" i="0" dirty="0">
                           <a:solidFill>
                             <a:srgbClr val="2E7D32"/>
                           </a:solidFill>
@@ -1698,7 +1698,7 @@
                     <a:p>
                       <a:pPr algn="ctr"/>
                       <a:r>
-                        <a:rPr lang="en-US" sz="2000" b="1" i="0">
+                        <a:rPr lang="en-US" sz="1800" b="1" i="0" dirty="0">
                           <a:solidFill>
                             <a:srgbClr val="2E7D32"/>
                           </a:solidFill>
@@ -1725,7 +1725,7 @@
                     <a:p>
                       <a:pPr algn="ctr"/>
                       <a:r>
-                        <a:rPr lang="en-US" sz="2000" b="1" i="0">
+                        <a:rPr lang="en-US" sz="1800" b="1" i="0" dirty="0">
                           <a:solidFill>
                             <a:srgbClr val="000000"/>
                           </a:solidFill>
@@ -1750,7 +1750,7 @@
                     <a:p>
                       <a:pPr algn="ctr"/>
                       <a:r>
-                        <a:rPr lang="en-US" sz="2000" b="1" i="0">
+                        <a:rPr lang="en-US" sz="1800" b="1" i="0" dirty="0">
                           <a:solidFill>
                             <a:srgbClr val="000000"/>
                           </a:solidFill>
@@ -1775,7 +1775,7 @@
                     <a:p>
                       <a:pPr algn="ctr"/>
                       <a:r>
-                        <a:rPr lang="en-US" sz="2000" b="1" i="0">
+                        <a:rPr lang="en-US" sz="1800" b="1" i="0" dirty="0">
                           <a:solidFill>
                             <a:srgbClr val="000000"/>
                           </a:solidFill>
@@ -1800,7 +1800,7 @@
                     <a:p>
                       <a:pPr algn="ctr"/>
                       <a:r>
-                        <a:rPr lang="en-US" sz="2000" b="1" i="0">
+                        <a:rPr lang="en-US" sz="1800" b="1" i="0" dirty="0">
                           <a:solidFill>
                             <a:srgbClr val="000000"/>
                           </a:solidFill>
@@ -3210,7 +3210,7 @@
                     <a:p>
                       <a:pPr algn="ctr"/>
                       <a:r>
-                        <a:rPr lang="en-US" sz="2000" b="1" i="0">
+                        <a:rPr lang="en-US" sz="1800" b="1" i="0" dirty="0">
                           <a:solidFill>
                             <a:srgbClr val="FFFFFF"/>
                           </a:solidFill>
@@ -3235,7 +3235,7 @@
                     <a:p>
                       <a:pPr algn="ctr"/>
                       <a:r>
-                        <a:rPr lang="en-US" sz="2000" b="1" i="0">
+                        <a:rPr lang="en-US" sz="1800" b="1" i="0" dirty="0">
                           <a:solidFill>
                             <a:srgbClr val="FFFFFF"/>
                           </a:solidFill>
@@ -3260,7 +3260,7 @@
                     <a:p>
                       <a:pPr algn="ctr"/>
                       <a:r>
-                        <a:rPr lang="en-US" sz="2000" b="1" i="0">
+                        <a:rPr lang="en-US" sz="1800" b="1" i="0" dirty="0">
                           <a:solidFill>
                             <a:srgbClr val="FFFFFF"/>
                           </a:solidFill>
@@ -3285,7 +3285,7 @@
                     <a:p>
                       <a:pPr algn="ctr"/>
                       <a:r>
-                        <a:rPr lang="en-US" sz="2000" b="1" i="0">
+                        <a:rPr lang="en-US" sz="1800" b="1" i="0" dirty="0">
                           <a:solidFill>
                             <a:srgbClr val="FFFFFF"/>
                           </a:solidFill>
@@ -3310,7 +3310,7 @@
                     <a:p>
                       <a:pPr algn="ctr"/>
                       <a:r>
-                        <a:rPr lang="en-US" sz="2000" b="1" i="0">
+                        <a:rPr lang="en-US" sz="1800" b="1" i="0" dirty="0">
                           <a:solidFill>
                             <a:srgbClr val="FFFFFF"/>
                           </a:solidFill>
@@ -3337,6 +3337,20 @@
                     <a:p>
                       <a:pPr algn="ctr"/>
                       <a:r>
+                        <a:rPr lang="en-US" sz="1800" b="0" i="0" dirty="0">
+                          <a:solidFill>
+                            <a:srgbClr val="1F497D"/>
+                          </a:solidFill>
+                          <a:latin typeface="Calibri"/>
+                          <a:ea typeface="Calibri"/>
+                          <a:cs typeface="Calibri"/>
+                        </a:rPr>
+                        <a:t>Research</a:t>
+                      </a:r>
+                    </a:p>
+                    <a:p>
+                      <a:pPr algn="ctr"/>
+                      <a:r>
                         <a:rPr lang="en-US" sz="2000" b="0" i="0">
                           <a:solidFill>
                             <a:srgbClr val="1F497D"/>
@@ -3345,7 +3359,32 @@
                           <a:ea typeface="Calibri"/>
                           <a:cs typeface="Calibri"/>
                         </a:rPr>
-                        <a:t>Research</a:t>
+                        <a:t>&amp; Planning</a:t>
+                      </a:r>
+                    </a:p>
+                  </a:txBody>
+                </a:tc>
+                <a:tc>
+                  <a:tcPr marL="91440" marR="91440" marT="45720" marB="45720" anchor="ctr" anchorCtr="0">
+                    <a:solidFill>
+                      <a:srgbClr val="BDD7EE"/>
+                    </a:solidFill>
+                  </a:tcPr>
+                  <a:txBody>
+                    <a:bodyPr rot="0" vert="horz" anchor="ctr" anchorCtr="0" wrap="square"/>
+                    <a:lstStyle/>
+                    <a:p>
+                      <a:pPr algn="ctr"/>
+                      <a:r>
+                        <a:rPr lang="en-US" sz="1800" b="0" i="0" dirty="0">
+                          <a:solidFill>
+                            <a:srgbClr val="1F497D"/>
+                          </a:solidFill>
+                          <a:latin typeface="Calibri"/>
+                          <a:ea typeface="Calibri"/>
+                          <a:cs typeface="Calibri"/>
+                        </a:rPr>
+                        <a:t>Design</a:t>
                       </a:r>
                     </a:p>
                     <a:p>
@@ -3359,32 +3398,71 @@
                           <a:ea typeface="Calibri"/>
                           <a:cs typeface="Calibri"/>
                         </a:rPr>
-                        <a:t>&amp; Planning</a:t>
-                      </a:r>
-                    </a:p>
-                  </a:txBody>
-                </a:tc>
-                <a:tc>
-                  <a:tcPr marL="91440" marR="91440" marT="45720" marB="45720" anchor="ctr" anchorCtr="0">
-                    <a:solidFill>
-                      <a:srgbClr val="BDD7EE"/>
-                    </a:solidFill>
-                  </a:tcPr>
-                  <a:txBody>
-                    <a:bodyPr rot="0" vert="horz" anchor="ctr" anchorCtr="0" wrap="square"/>
-                    <a:lstStyle/>
+                        <a:t>Phase</a:t>
+                      </a:r>
+                    </a:p>
+                  </a:txBody>
+                </a:tc>
+                <a:tc>
+                  <a:tcPr marL="91440" marR="91440" marT="45720" marB="45720" anchor="ctr" anchorCtr="0">
+                    <a:solidFill>
+                      <a:srgbClr val="C6EFCE"/>
+                    </a:solidFill>
+                  </a:tcPr>
+                  <a:txBody>
+                    <a:bodyPr rot="0" vert="horz" anchor="ctr" anchorCtr="0" wrap="square"/>
+                    <a:lstStyle/>
+                    <a:p>
+                      <a:pPr algn="ctr"/>
+                      <a:r>
+                        <a:rPr lang="en-US" sz="1800" b="0" i="0" dirty="0">
+                          <a:solidFill>
+                            <a:srgbClr val="006100"/>
+                          </a:solidFill>
+                          <a:latin typeface="Calibri"/>
+                          <a:ea typeface="Calibri"/>
+                          <a:cs typeface="Calibri"/>
+                        </a:rPr>
+                        <a:t>Development</a:t>
+                      </a:r>
+                    </a:p>
                     <a:p>
                       <a:pPr algn="ctr"/>
                       <a:r>
                         <a:rPr lang="en-US" sz="2000" b="0" i="0">
                           <a:solidFill>
-                            <a:srgbClr val="1F497D"/>
-                          </a:solidFill>
-                          <a:latin typeface="Calibri"/>
-                          <a:ea typeface="Calibri"/>
-                          <a:cs typeface="Calibri"/>
-                        </a:rPr>
-                        <a:t>Design</a:t>
+                            <a:srgbClr val="006100"/>
+                          </a:solidFill>
+                          <a:latin typeface="Calibri"/>
+                          <a:ea typeface="Calibri"/>
+                          <a:cs typeface="Calibri"/>
+                        </a:rPr>
+                        <a:t>Sprint 1-3</a:t>
+                      </a:r>
+                    </a:p>
+                  </a:txBody>
+                </a:tc>
+                <a:tc>
+                  <a:tcPr marL="91440" marR="91440" marT="45720" marB="45720" anchor="ctr" anchorCtr="0">
+                    <a:solidFill>
+                      <a:srgbClr val="FCE4D6"/>
+                    </a:solidFill>
+                  </a:tcPr>
+                  <a:txBody>
+                    <a:bodyPr rot="0" vert="horz" anchor="ctr" anchorCtr="0" wrap="square"/>
+                    <a:lstStyle/>
+                    <a:p>
+                      <a:pPr algn="ctr"/>
+                      <a:r>
+                        <a:rPr lang="en-US" sz="1800" b="0" i="0" dirty="0">
+                          <a:solidFill>
+                            <a:srgbClr val="C65911"/>
+                          </a:solidFill>
+                          <a:latin typeface="Calibri"/>
+                          <a:ea typeface="Calibri"/>
+                          <a:cs typeface="Calibri"/>
+                        </a:rPr>
+                        <a:t>Testing</a:t>
                       </a:r>
                     </a:p>
                     <a:p>
@@ -3392,90 +3470,12 @@
                       <a:r>
                         <a:rPr lang="en-US" sz="2000" b="0" i="0">
                           <a:solidFill>
-                            <a:srgbClr val="1F497D"/>
-                          </a:solidFill>
-                          <a:latin typeface="Calibri"/>
-                          <a:ea typeface="Calibri"/>
-                          <a:cs typeface="Calibri"/>
-                        </a:rPr>
-                        <a:t>Phase</a:t>
-                      </a:r>
-                    </a:p>
-                  </a:txBody>
-                </a:tc>
-                <a:tc>
-                  <a:tcPr marL="91440" marR="91440" marT="45720" marB="45720" anchor="ctr" anchorCtr="0">
-                    <a:solidFill>
-                      <a:srgbClr val="C6EFCE"/>
-                    </a:solidFill>
-                  </a:tcPr>
-                  <a:txBody>
-                    <a:bodyPr rot="0" vert="horz" anchor="ctr" anchorCtr="0" wrap="square"/>
-                    <a:lstStyle/>
-                    <a:p>
-                      <a:pPr algn="ctr"/>
-                      <a:r>
-                        <a:rPr lang="en-US" sz="2000" b="0" i="0">
-                          <a:solidFill>
-                            <a:srgbClr val="006100"/>
-                          </a:solidFill>
-                          <a:latin typeface="Calibri"/>
-                          <a:ea typeface="Calibri"/>
-                          <a:cs typeface="Calibri"/>
-                        </a:rPr>
-                        <a:t>Development</a:t>
-                      </a:r>
-                    </a:p>
-                    <a:p>
-                      <a:pPr algn="ctr"/>
-                      <a:r>
-                        <a:rPr lang="en-US" sz="2000" b="0" i="0">
-                          <a:solidFill>
-                            <a:srgbClr val="006100"/>
-                          </a:solidFill>
-                          <a:latin typeface="Calibri"/>
-                          <a:ea typeface="Calibri"/>
-                          <a:cs typeface="Calibri"/>
-                        </a:rPr>
-                        <a:t>Sprint 1-3</a:t>
-                      </a:r>
-                    </a:p>
-                  </a:txBody>
-                </a:tc>
-                <a:tc>
-                  <a:tcPr marL="91440" marR="91440" marT="45720" marB="45720" anchor="ctr" anchorCtr="0">
-                    <a:solidFill>
-                      <a:srgbClr val="FCE4D6"/>
-                    </a:solidFill>
-                  </a:tcPr>
-                  <a:txBody>
-                    <a:bodyPr rot="0" vert="horz" anchor="ctr" anchorCtr="0" wrap="square"/>
-                    <a:lstStyle/>
-                    <a:p>
-                      <a:pPr algn="ctr"/>
-                      <a:r>
-                        <a:rPr lang="en-US" sz="2000" b="0" i="0">
-                          <a:solidFill>
                             <a:srgbClr val="C65911"/>
                           </a:solidFill>
                           <a:latin typeface="Calibri"/>
                           <a:ea typeface="Calibri"/>
                           <a:cs typeface="Calibri"/>
                         </a:rPr>
-                        <a:t>Testing</a:t>
-                      </a:r>
-                    </a:p>
-                    <a:p>
-                      <a:pPr algn="ctr"/>
-                      <a:r>
-                        <a:rPr lang="en-US" sz="2000" b="0" i="0">
-                          <a:solidFill>
-                            <a:srgbClr val="C65911"/>
-                          </a:solidFill>
-                          <a:latin typeface="Calibri"/>
-                          <a:ea typeface="Calibri"/>
-                          <a:cs typeface="Calibri"/>
-                        </a:rPr>
                         <a:t>&amp; QA</a:t>
                       </a:r>
                     </a:p>
@@ -3493,7 +3493,7 @@
                     <a:p>
                       <a:pPr algn="ctr"/>
                       <a:r>
-                        <a:rPr lang="en-US" sz="2000" b="0" i="0">
+                        <a:rPr lang="en-US" sz="1800" b="0" i="0" dirty="0">
                           <a:solidFill>
                             <a:srgbClr val="375623"/>
                           </a:solidFill>
@@ -3534,7 +3534,7 @@
                     <a:p>
                       <a:pPr algn="ctr"/>
                       <a:r>
-                        <a:rPr lang="en-US" sz="2000" b="1" i="0">
+                        <a:rPr lang="en-US" sz="1800" b="1" i="0" dirty="0">
                           <a:solidFill>
                             <a:srgbClr val="2E7D32"/>
                           </a:solidFill>
@@ -3559,7 +3559,7 @@
                     <a:p>
                       <a:pPr algn="ctr"/>
                       <a:r>
-                        <a:rPr lang="en-US" sz="2000" b="1" i="0">
+                        <a:rPr lang="en-US" sz="1800" b="1" i="0" dirty="0">
                           <a:solidFill>
                             <a:srgbClr val="2E7D32"/>
                           </a:solidFill>
@@ -3584,7 +3584,7 @@
                     <a:p>
                       <a:pPr algn="ctr"/>
                       <a:r>
-                        <a:rPr lang="en-US" sz="2000" b="0" i="0">
+                        <a:rPr lang="en-US" sz="1800" b="0" i="0" dirty="0">
                           <a:solidFill>
                             <a:srgbClr val="ED7D31"/>
                           </a:solidFill>
@@ -3609,7 +3609,7 @@
                     <a:p>
                       <a:pPr algn="ctr"/>
                       <a:r>
-                        <a:rPr lang="en-US" sz="2000" b="0" i="0">
+                        <a:rPr lang="en-US" sz="1800" b="0" i="0" dirty="0">
                           <a:solidFill>
                             <a:srgbClr val="7F7F7F"/>
                           </a:solidFill>
@@ -3634,7 +3634,7 @@
                     <a:p>
                       <a:pPr algn="ctr"/>
                       <a:r>
-                        <a:rPr lang="en-US" sz="2000" b="0" i="0">
+                        <a:rPr lang="en-US" sz="1800" b="0" i="0" dirty="0">
                           <a:solidFill>
                             <a:srgbClr val="7F7F7F"/>
                           </a:solidFill>
@@ -4641,7 +4641,7 @@
                     <a:p>
                       <a:pPr algn="ctr"/>
                       <a:r>
-                        <a:rPr lang="en-US" sz="2000" b="1" i="0">
+                        <a:rPr lang="en-US" sz="1800" b="1" i="0" dirty="0">
                           <a:solidFill>
                             <a:srgbClr val="000000"/>
                           </a:solidFill>
@@ -4666,7 +4666,7 @@
                     <a:p>
                       <a:pPr algn="ctr"/>
                       <a:r>
-                        <a:rPr lang="en-US" sz="2000" b="1" i="0">
+                        <a:rPr lang="en-US" sz="1800" b="1" i="0" dirty="0">
                           <a:solidFill>
                             <a:srgbClr val="000000"/>
                           </a:solidFill>
@@ -4691,7 +4691,7 @@
                     <a:p>
                       <a:pPr algn="ctr"/>
                       <a:r>
-                        <a:rPr lang="en-US" sz="2000" b="1" i="0">
+                        <a:rPr lang="en-US" sz="1800" b="1" i="0" dirty="0">
                           <a:solidFill>
                             <a:srgbClr val="000000"/>
                           </a:solidFill>
@@ -4718,7 +4718,7 @@
                     <a:p>
                       <a:pPr algn="ctr"/>
                       <a:r>
-                        <a:rPr lang="en-US" sz="2000" b="1" i="0">
+                        <a:rPr lang="en-US" sz="1800" b="1" i="0" dirty="0">
                           <a:solidFill>
                             <a:srgbClr val="000000"/>
                           </a:solidFill>
@@ -4743,7 +4743,7 @@
                     <a:p>
                       <a:pPr algn="ctr"/>
                       <a:r>
-                        <a:rPr lang="en-US" sz="2000" b="0" i="0">
+                        <a:rPr lang="en-US" sz="1800" b="0" i="0" dirty="0">
                           <a:solidFill>
                             <a:srgbClr val="000000"/>
                           </a:solidFill>
@@ -4768,7 +4768,7 @@
                     <a:p>
                       <a:pPr algn="ctr"/>
                       <a:r>
-                        <a:rPr lang="en-US" sz="2000" b="0" i="0">
+                        <a:rPr lang="en-US" sz="1800" b="0" i="0" dirty="0">
                           <a:solidFill>
                             <a:srgbClr val="000000"/>
                           </a:solidFill>
@@ -4795,7 +4795,7 @@
                     <a:p>
                       <a:pPr algn="ctr"/>
                       <a:r>
-                        <a:rPr lang="en-US" sz="2000" b="0" i="0">
+                        <a:rPr lang="en-US" sz="1800" b="0" i="0" dirty="0">
                           <a:solidFill>
                             <a:srgbClr val="000000"/>
                           </a:solidFill>
@@ -4820,7 +4820,7 @@
                     <a:p>
                       <a:pPr algn="ctr"/>
                       <a:r>
-                        <a:rPr lang="en-US" sz="2000" b="0" i="0">
+                        <a:rPr lang="en-US" sz="1800" b="0" i="0" dirty="0">
                           <a:solidFill>
                             <a:srgbClr val="000000"/>
                           </a:solidFill>
@@ -4845,7 +4845,7 @@
                     <a:p>
                       <a:pPr algn="ctr"/>
                       <a:r>
-                        <a:rPr lang="en-US" sz="2000" b="0" i="0">
+                        <a:rPr lang="en-US" sz="1800" b="0" i="0" dirty="0">
                           <a:solidFill>
                             <a:srgbClr val="000000"/>
                           </a:solidFill>
@@ -4872,7 +4872,7 @@
                     <a:p>
                       <a:pPr algn="ctr"/>
                       <a:r>
-                        <a:rPr lang="en-US" sz="2000" b="0" i="0">
+                        <a:rPr lang="en-US" sz="1800" b="0" i="0" dirty="0">
                           <a:solidFill>
                             <a:srgbClr val="000000"/>
                           </a:solidFill>
@@ -4897,7 +4897,7 @@
                     <a:p>
                       <a:pPr algn="ctr"/>
                       <a:r>
-                        <a:rPr lang="en-US" sz="2000" b="0" i="0">
+                        <a:rPr lang="en-US" sz="1800" b="0" i="0" dirty="0">
                           <a:solidFill>
                             <a:srgbClr val="000000"/>
                           </a:solidFill>
@@ -4922,7 +4922,7 @@
                     <a:p>
                       <a:pPr algn="ctr"/>
                       <a:r>
-                        <a:rPr lang="en-US" sz="2000" b="1" i="0">
+                        <a:rPr lang="en-US" sz="1800" b="1" i="0" dirty="0">
                           <a:solidFill>
                             <a:srgbClr val="000000"/>
                           </a:solidFill>

</xml_diff>

<commit_message>
Update TODO.md to reflect v1.0.18 modularization completion and reorganize mermaid module structure
- Mark completed: slide_xml modularization (mod.rs, common.rs, layouts.rs, content.rs) and mermaid modularization (9 diagram type modules)
- Update test count from 592 to 451+ tests passing
- Move mermaid code from cli/markdown/mermaid.rs to dedicated mermaid/ module with separate files for each diagram type (flowchart, sequence, pie, gantt, class_diagram, state_diagram, er_diagram, mindmap, timeline
</commit_message>
<xml_diff>
--- a/comprehensive_demo.pptx
+++ b/comprehensive_demo.pptx
@@ -3773,7 +3773,7 @@
           <a:p>
             <a:pPr lvl="0"/>
             <a:r>
-              <a:rPr lang="en-US" sz="2800" b="1" i="1" dirty="0" u="sng">
+              <a:rPr lang="en-US" sz="2800" b="1" i="1" dirty="0">
                 <a:solidFill>
                   <a:srgbClr val="4F81BD"/>
                 </a:solidFill>
@@ -3784,7 +3784,7 @@
           <a:p>
             <a:pPr lvl="0"/>
             <a:r>
-              <a:rPr lang="en-US" sz="2800" b="1" i="1" dirty="0" u="sng">
+              <a:rPr lang="en-US" sz="2800" b="1" i="1" dirty="0">
                 <a:solidFill>
                   <a:srgbClr val="4F81BD"/>
                 </a:solidFill>
@@ -3795,7 +3795,7 @@
           <a:p>
             <a:pPr lvl="0"/>
             <a:r>
-              <a:rPr lang="en-US" sz="2800" b="1" i="1" dirty="0" u="sng">
+              <a:rPr lang="en-US" sz="2800" b="1" i="1" dirty="0">
                 <a:solidFill>
                   <a:srgbClr val="4F81BD"/>
                 </a:solidFill>
@@ -3806,7 +3806,7 @@
           <a:p>
             <a:pPr lvl="0"/>
             <a:r>
-              <a:rPr lang="en-US" sz="2800" b="1" i="1" dirty="0" u="sng">
+              <a:rPr lang="en-US" sz="2800" b="1" i="1" dirty="0">
                 <a:solidFill>
                   <a:srgbClr val="4F81BD"/>
                 </a:solidFill>
@@ -3817,7 +3817,7 @@
           <a:p>
             <a:pPr lvl="0"/>
             <a:r>
-              <a:rPr lang="en-US" sz="2800" b="1" i="1" dirty="0" u="sng">
+              <a:rPr lang="en-US" sz="2800" b="1" i="1" dirty="0">
                 <a:solidFill>
                   <a:srgbClr val="4F81BD"/>
                 </a:solidFill>
@@ -3828,7 +3828,7 @@
           <a:p>
             <a:pPr lvl="0"/>
             <a:r>
-              <a:rPr lang="en-US" sz="2800" b="1" i="1" dirty="0" u="sng">
+              <a:rPr lang="en-US" sz="2800" b="1" i="1" dirty="0">
                 <a:solidFill>
                   <a:srgbClr val="4F81BD"/>
                 </a:solidFill>

</xml_diff>

<commit_message>
Refactor bullet point formatting and enhance text properties in slide generation
- Removed deprecated text formatting methods and introduced a new `BulletTextFormat` struct for comprehensive bullet styling options.
- Updated `BulletPoint` to support advanced formatting features such as bold, italic, strikethrough, subscript, superscript, color, and highlight.
- Enhanced slide content generation to utilize the new formatting capabilities, allowing for more visually appealing presentations.
- Updated font size constants to reflect point values directly, simplifying usage in slide content.
- Improved XML generation for bullet points to accommodate extended text properties.
</commit_message>
<xml_diff>
--- a/comprehensive_demo.pptx
+++ b/comprehensive_demo.pptx
@@ -5488,8 +5488,8 @@
               <a:buChar char="•"/>
             </a:pPr>
             <a:r>
-              <a:rPr lang="en-US" sz="2400" b="0" i="0" dirty="0"/>
-              <a:t>Strikethrough: For deleted or deprecated text</a:t>
+              <a:rPr lang="en-US" sz="2400" b="0" i="0" dirty="0" strike="sngStrike"/>
+              <a:t>Strikethrough: This text is crossed out</a:t>
             </a:r>
           </a:p>
           <a:p>
@@ -5497,7 +5497,11 @@
               <a:buChar char="•"/>
             </a:pPr>
             <a:r>
-              <a:rPr lang="en-US" sz="2400" b="0" i="0" dirty="0"/>
+              <a:rPr lang="en-US" sz="2400" b="0" i="0" dirty="0">
+                <a:highlight>
+                  <a:srgbClr val="FFFF00"/>
+                </a:highlight>
+              </a:rPr>
               <a:t>Highlight: Yellow background for emphasis</a:t>
             </a:r>
           </a:p>
@@ -5506,8 +5510,8 @@
               <a:buChar char="•"/>
             </a:pPr>
             <a:r>
-              <a:rPr lang="en-US" sz="2400" b="0" i="0" dirty="0"/>
-              <a:t>Subscript: H₂O chemical formulas</a:t>
+              <a:rPr lang="en-US" sz="2400" b="0" i="0" dirty="0" baseline="-25000"/>
+              <a:t>Subscript: H₂O - for chemical formulas</a:t>
             </a:r>
           </a:p>
           <a:p>
@@ -5515,8 +5519,8 @@
               <a:buChar char="•"/>
             </a:pPr>
             <a:r>
-              <a:rPr lang="en-US" sz="2400" b="0" i="0" dirty="0"/>
-              <a:t>Superscript: x² mathematical expressions</a:t>
+              <a:rPr lang="en-US" sz="2400" b="0" i="0" dirty="0" baseline="30000"/>
+              <a:t>Superscript: x² - for math expressions</a:t>
             </a:r>
           </a:p>
           <a:p>
@@ -5524,8 +5528,12 @@
               <a:buChar char="•"/>
             </a:pPr>
             <a:r>
-              <a:rPr lang="en-US" sz="2400" b="0" i="0" dirty="0"/>
-              <a:t>Combined: Bold + Italic + Underline + Color</a:t>
+              <a:rPr lang="en-US" sz="2400" b="1" i="0" dirty="0">
+                <a:solidFill>
+                  <a:srgbClr val="FF0000"/>
+                </a:solidFill>
+              </a:rPr>
+              <a:t>Combined: Bold + Red color</a:t>
             </a:r>
           </a:p>
         </p:txBody>
@@ -5748,7 +5756,7 @@
                   <a:srgbClr val="1F497D"/>
                 </a:solidFill>
               </a:rPr>
-              <a:t>Font Size Presets</a:t>
+              <a:t>Font Size Presets - Each line different size</a:t>
             </a:r>
           </a:p>
         </p:txBody>
@@ -5777,8 +5785,8 @@
               <a:buChar char="•"/>
             </a:pPr>
             <a:r>
-              <a:rPr lang="en-US" sz="2400" b="0" i="0" dirty="0"/>
-              <a:t>TITLE: 44 (44pt)</a:t>
+              <a:rPr lang="en-US" sz="3600" b="0" i="0" dirty="0"/>
+              <a:t>LARGE: 36pt - Extra large text</a:t>
             </a:r>
           </a:p>
           <a:p>
@@ -5786,8 +5794,8 @@
               <a:buChar char="•"/>
             </a:pPr>
             <a:r>
-              <a:rPr lang="en-US" sz="2400" b="0" i="0" dirty="0"/>
-              <a:t>SUBTITLE: 32 (32pt)</a:t>
+              <a:rPr lang="en-US" sz="2800" b="0" i="0" dirty="0"/>
+              <a:t>HEADING: 28pt - Section headers</a:t>
             </a:r>
           </a:p>
           <a:p>
@@ -5795,8 +5803,8 @@
               <a:buChar char="•"/>
             </a:pPr>
             <a:r>
-              <a:rPr lang="en-US" sz="2400" b="0" i="0" dirty="0"/>
-              <a:t>HEADING: 28 (28pt)</a:t>
+              <a:rPr lang="en-US" sz="1800" b="0" i="0" dirty="0"/>
+              <a:t>BODY: 18pt - Regular content</a:t>
             </a:r>
           </a:p>
           <a:p>
@@ -5804,8 +5812,8 @@
               <a:buChar char="•"/>
             </a:pPr>
             <a:r>
-              <a:rPr lang="en-US" sz="2400" b="0" i="0" dirty="0"/>
-              <a:t>BODY: 18 (18pt)</a:t>
+              <a:rPr lang="en-US" sz="1400" b="0" i="0" dirty="0"/>
+              <a:t>SMALL: 14pt - Smaller text</a:t>
             </a:r>
           </a:p>
           <a:p>
@@ -5813,17 +5821,8 @@
               <a:buChar char="•"/>
             </a:pPr>
             <a:r>
-              <a:rPr lang="en-US" sz="2400" b="0" i="0" dirty="0"/>
-              <a:t>SMALL: 14 (14pt)</a:t>
-            </a:r>
-          </a:p>
-          <a:p>
-            <a:pPr lvl="0" marL="457200" indent="-457200">
-              <a:buChar char="•"/>
-            </a:pPr>
-            <a:r>
-              <a:rPr lang="en-US" sz="2400" b="0" i="0" dirty="0"/>
-              <a:t>CAPTION: 12 (12pt)</a:t>
+              <a:rPr lang="en-US" sz="1200" b="0" i="0" dirty="0"/>
+              <a:t>CAPTION: 12pt - Captions and notes</a:t>
             </a:r>
           </a:p>
         </p:txBody>

</xml_diff>